<commit_message>
Added to Users slide
Added some points to the user's slide
</commit_message>
<xml_diff>
--- a/471 presentation.pptx
+++ b/471 presentation.pptx
@@ -109,6 +109,11 @@
       </a:defRPr>
     </a:lvl9pPr>
   </p:defaultTextStyle>
+  <p:extLst>
+    <p:ext uri="{EFAFB233-063F-42B5-8137-9DF3F51BA10A}">
+      <p15:sldGuideLst xmlns:p15="http://schemas.microsoft.com/office/powerpoint/2012/main"/>
+    </p:ext>
+  </p:extLst>
 </p:presentation>
 </file>
 
@@ -3394,6 +3399,13 @@
   <p:clrMapOvr>
     <a:masterClrMapping/>
   </p:clrMapOvr>
+  <p:timing>
+    <p:tnLst>
+      <p:par>
+        <p:cTn id="1" dur="indefinite" restart="never" nodeType="tmRoot"/>
+      </p:par>
+    </p:tnLst>
+  </p:timing>
 </p:sld>
 </file>
 
@@ -3455,30 +3467,599 @@
         </p:nvSpPr>
         <p:spPr>
           <a:xfrm>
-            <a:off x="2231136" y="2068946"/>
-            <a:ext cx="7729728" cy="3671082"/>
+            <a:off x="1212827" y="2379842"/>
+            <a:ext cx="3127248" cy="2987686"/>
           </a:xfrm>
         </p:spPr>
         <p:txBody>
-          <a:bodyPr/>
-          <a:lstStyle/>
-          <a:p>
+          <a:bodyPr>
+            <a:normAutofit/>
+          </a:bodyPr>
+          <a:lstStyle/>
+          <a:p>
+            <a:pPr marL="0" indent="0" algn="ctr">
+              <a:buNone/>
+            </a:pPr>
+            <a:r>
+              <a:rPr lang="en-CA" sz="2000" b="1" u="sng" dirty="0" smtClean="0"/>
+              <a:t>Shoppers</a:t>
+            </a:r>
+          </a:p>
+          <a:p>
+            <a:pPr lvl="1"/>
+            <a:r>
+              <a:rPr lang="en-CA" dirty="0" smtClean="0"/>
+              <a:t>Browse</a:t>
+            </a:r>
+          </a:p>
+          <a:p>
+            <a:pPr lvl="1"/>
+            <a:r>
+              <a:rPr lang="en-CA" dirty="0" smtClean="0"/>
+              <a:t>Add items to shopping cart</a:t>
+            </a:r>
+          </a:p>
+          <a:p>
+            <a:pPr lvl="1"/>
+            <a:r>
+              <a:rPr lang="en-CA" dirty="0" smtClean="0"/>
+              <a:t>Purchase items</a:t>
+            </a:r>
+            <a:endParaRPr lang="en-CA" dirty="0"/>
+          </a:p>
+          <a:p>
+            <a:pPr lvl="1"/>
+            <a:r>
+              <a:rPr lang="en-CA" dirty="0" smtClean="0"/>
+              <a:t>Leave seller/item reviews</a:t>
+            </a:r>
+            <a:endParaRPr lang="en-CA" dirty="0"/>
+          </a:p>
+        </p:txBody>
+      </p:sp>
+      <p:sp>
+        <p:nvSpPr>
+          <p:cNvPr id="4" name="Content Placeholder 2"/>
+          <p:cNvSpPr txBox="1">
+            <a:spLocks/>
+          </p:cNvSpPr>
+          <p:nvPr/>
+        </p:nvSpPr>
+        <p:spPr>
+          <a:xfrm>
+            <a:off x="4464765" y="2418820"/>
+            <a:ext cx="2927466" cy="4030102"/>
+          </a:xfrm>
+          <a:prstGeom prst="rect">
+            <a:avLst/>
+          </a:prstGeom>
+        </p:spPr>
+        <p:txBody>
+          <a:bodyPr vert="horz" lIns="91440" tIns="45720" rIns="91440" bIns="45720" rtlCol="0">
+            <a:normAutofit/>
+          </a:bodyPr>
+          <a:lstStyle>
+            <a:lvl1pPr marL="228600" indent="-228600" algn="l" defTabSz="914400" rtl="0" eaLnBrk="1" latinLnBrk="0" hangingPunct="1">
+              <a:lnSpc>
+                <a:spcPct val="100000"/>
+              </a:lnSpc>
+              <a:spcBef>
+                <a:spcPts val="1000"/>
+              </a:spcBef>
+              <a:buClr>
+                <a:schemeClr val="accent2"/>
+              </a:buClr>
+              <a:buFont typeface="Arial" panose="020B0604020202020204" pitchFamily="34" charset="0"/>
+              <a:buChar char="•"/>
+              <a:defRPr sz="1800" kern="1200">
+                <a:solidFill>
+                  <a:schemeClr val="tx1">
+                    <a:lumMod val="85000"/>
+                    <a:lumOff val="15000"/>
+                  </a:schemeClr>
+                </a:solidFill>
+                <a:latin typeface="+mn-lt"/>
+                <a:ea typeface="+mn-ea"/>
+                <a:cs typeface="+mn-cs"/>
+              </a:defRPr>
+            </a:lvl1pPr>
+            <a:lvl2pPr marL="457200" indent="-228600" algn="l" defTabSz="914400" rtl="0" eaLnBrk="1" latinLnBrk="0" hangingPunct="1">
+              <a:lnSpc>
+                <a:spcPct val="100000"/>
+              </a:lnSpc>
+              <a:spcBef>
+                <a:spcPts val="1000"/>
+              </a:spcBef>
+              <a:buClr>
+                <a:schemeClr val="accent2"/>
+              </a:buClr>
+              <a:buFont typeface="Arial" panose="020B0604020202020204" pitchFamily="34" charset="0"/>
+              <a:buChar char="•"/>
+              <a:defRPr sz="1600" kern="1200">
+                <a:solidFill>
+                  <a:schemeClr val="tx1">
+                    <a:lumMod val="85000"/>
+                    <a:lumOff val="15000"/>
+                  </a:schemeClr>
+                </a:solidFill>
+                <a:latin typeface="+mn-lt"/>
+                <a:ea typeface="+mn-ea"/>
+                <a:cs typeface="+mn-cs"/>
+              </a:defRPr>
+            </a:lvl2pPr>
+            <a:lvl3pPr marL="685800" indent="-228600" algn="l" defTabSz="914400" rtl="0" eaLnBrk="1" latinLnBrk="0" hangingPunct="1">
+              <a:lnSpc>
+                <a:spcPct val="100000"/>
+              </a:lnSpc>
+              <a:spcBef>
+                <a:spcPts val="1000"/>
+              </a:spcBef>
+              <a:buClr>
+                <a:schemeClr val="accent2"/>
+              </a:buClr>
+              <a:buFont typeface="Arial" panose="020B0604020202020204" pitchFamily="34" charset="0"/>
+              <a:buChar char="•"/>
+              <a:defRPr sz="1600" kern="1200">
+                <a:solidFill>
+                  <a:schemeClr val="tx1">
+                    <a:lumMod val="85000"/>
+                    <a:lumOff val="15000"/>
+                  </a:schemeClr>
+                </a:solidFill>
+                <a:latin typeface="+mn-lt"/>
+                <a:ea typeface="+mn-ea"/>
+                <a:cs typeface="+mn-cs"/>
+              </a:defRPr>
+            </a:lvl3pPr>
+            <a:lvl4pPr marL="914400" indent="-228600" algn="l" defTabSz="914400" rtl="0" eaLnBrk="1" latinLnBrk="0" hangingPunct="1">
+              <a:lnSpc>
+                <a:spcPct val="100000"/>
+              </a:lnSpc>
+              <a:spcBef>
+                <a:spcPts val="1000"/>
+              </a:spcBef>
+              <a:buClr>
+                <a:schemeClr val="accent2"/>
+              </a:buClr>
+              <a:buFont typeface="Arial" panose="020B0604020202020204" pitchFamily="34" charset="0"/>
+              <a:buChar char="•"/>
+              <a:defRPr sz="1600" kern="1200">
+                <a:solidFill>
+                  <a:schemeClr val="tx1">
+                    <a:lumMod val="85000"/>
+                    <a:lumOff val="15000"/>
+                  </a:schemeClr>
+                </a:solidFill>
+                <a:latin typeface="+mn-lt"/>
+                <a:ea typeface="+mn-ea"/>
+                <a:cs typeface="+mn-cs"/>
+              </a:defRPr>
+            </a:lvl4pPr>
+            <a:lvl5pPr marL="1143000" indent="-228600" algn="l" defTabSz="914400" rtl="0" eaLnBrk="1" latinLnBrk="0" hangingPunct="1">
+              <a:lnSpc>
+                <a:spcPct val="100000"/>
+              </a:lnSpc>
+              <a:spcBef>
+                <a:spcPts val="1000"/>
+              </a:spcBef>
+              <a:buClr>
+                <a:schemeClr val="accent2"/>
+              </a:buClr>
+              <a:buFont typeface="Arial" panose="020B0604020202020204" pitchFamily="34" charset="0"/>
+              <a:buChar char="•"/>
+              <a:defRPr sz="1600" kern="1200">
+                <a:solidFill>
+                  <a:schemeClr val="tx1">
+                    <a:lumMod val="85000"/>
+                    <a:lumOff val="15000"/>
+                  </a:schemeClr>
+                </a:solidFill>
+                <a:latin typeface="+mn-lt"/>
+                <a:ea typeface="+mn-ea"/>
+                <a:cs typeface="+mn-cs"/>
+              </a:defRPr>
+            </a:lvl5pPr>
+            <a:lvl6pPr marL="1312863" indent="-228600" algn="l" defTabSz="914400" rtl="0" eaLnBrk="1" latinLnBrk="0" hangingPunct="1">
+              <a:lnSpc>
+                <a:spcPct val="100000"/>
+              </a:lnSpc>
+              <a:spcBef>
+                <a:spcPts val="1000"/>
+              </a:spcBef>
+              <a:buClr>
+                <a:schemeClr val="accent2"/>
+              </a:buClr>
+              <a:buFont typeface="Arial" panose="020B0604020202020204" pitchFamily="34" charset="0"/>
+              <a:buChar char="•"/>
+              <a:defRPr sz="1600" kern="1200">
+                <a:solidFill>
+                  <a:schemeClr val="tx1"/>
+                </a:solidFill>
+                <a:latin typeface="+mn-lt"/>
+                <a:ea typeface="+mn-ea"/>
+                <a:cs typeface="+mn-cs"/>
+              </a:defRPr>
+            </a:lvl6pPr>
+            <a:lvl7pPr marL="1484313" indent="-228600" algn="l" defTabSz="914400" rtl="0" eaLnBrk="1" latinLnBrk="0" hangingPunct="1">
+              <a:lnSpc>
+                <a:spcPct val="100000"/>
+              </a:lnSpc>
+              <a:spcBef>
+                <a:spcPts val="1000"/>
+              </a:spcBef>
+              <a:buClr>
+                <a:schemeClr val="accent2"/>
+              </a:buClr>
+              <a:buFont typeface="Arial" panose="020B0604020202020204" pitchFamily="34" charset="0"/>
+              <a:buChar char="•"/>
+              <a:defRPr sz="1600" kern="1200">
+                <a:solidFill>
+                  <a:schemeClr val="tx1"/>
+                </a:solidFill>
+                <a:latin typeface="+mn-lt"/>
+                <a:ea typeface="+mn-ea"/>
+                <a:cs typeface="+mn-cs"/>
+              </a:defRPr>
+            </a:lvl7pPr>
+            <a:lvl8pPr marL="1657350" indent="-228600" algn="l" defTabSz="914400" rtl="0" eaLnBrk="1" latinLnBrk="0" hangingPunct="1">
+              <a:lnSpc>
+                <a:spcPct val="100000"/>
+              </a:lnSpc>
+              <a:spcBef>
+                <a:spcPts val="1000"/>
+              </a:spcBef>
+              <a:buClr>
+                <a:schemeClr val="accent2"/>
+              </a:buClr>
+              <a:buFont typeface="Arial" panose="020B0604020202020204" pitchFamily="34" charset="0"/>
+              <a:buChar char="•"/>
+              <a:defRPr sz="1600" kern="1200" baseline="0">
+                <a:solidFill>
+                  <a:schemeClr val="tx1"/>
+                </a:solidFill>
+                <a:latin typeface="+mn-lt"/>
+                <a:ea typeface="+mn-ea"/>
+                <a:cs typeface="+mn-cs"/>
+              </a:defRPr>
+            </a:lvl8pPr>
+            <a:lvl9pPr marL="1882775" indent="-228600" algn="l" defTabSz="914400" rtl="0" eaLnBrk="1" latinLnBrk="0" hangingPunct="1">
+              <a:lnSpc>
+                <a:spcPct val="100000"/>
+              </a:lnSpc>
+              <a:spcBef>
+                <a:spcPts val="1000"/>
+              </a:spcBef>
+              <a:buClr>
+                <a:schemeClr val="accent2"/>
+              </a:buClr>
+              <a:buFont typeface="Arial" panose="020B0604020202020204" pitchFamily="34" charset="0"/>
+              <a:buChar char="•"/>
+              <a:defRPr sz="1600" kern="1200" baseline="0">
+                <a:solidFill>
+                  <a:schemeClr val="tx1"/>
+                </a:solidFill>
+                <a:latin typeface="+mn-lt"/>
+                <a:ea typeface="+mn-ea"/>
+                <a:cs typeface="+mn-cs"/>
+              </a:defRPr>
+            </a:lvl9pPr>
+          </a:lstStyle>
+          <a:p>
+            <a:pPr marL="0" indent="0" algn="ctr">
+              <a:buNone/>
+            </a:pPr>
+            <a:r>
+              <a:rPr lang="en-CA" sz="2000" b="1" u="sng" dirty="0" smtClean="0"/>
+              <a:t>Private Seller/Business</a:t>
+            </a:r>
+          </a:p>
+          <a:p>
+            <a:pPr lvl="1"/>
+            <a:r>
+              <a:rPr lang="en-CA" dirty="0" smtClean="0"/>
+              <a:t>Post items to sell</a:t>
+            </a:r>
+          </a:p>
+          <a:p>
+            <a:pPr lvl="1"/>
+            <a:r>
+              <a:rPr lang="en-CA" dirty="0" smtClean="0"/>
+              <a:t>Fill in product description</a:t>
+            </a:r>
+          </a:p>
+          <a:p>
+            <a:pPr lvl="1"/>
+            <a:r>
+              <a:rPr lang="en-CA" dirty="0" smtClean="0"/>
+              <a:t>Update inventory</a:t>
+            </a:r>
+          </a:p>
+          <a:p>
+            <a:pPr lvl="1"/>
+            <a:r>
+              <a:rPr lang="en-CA" dirty="0" smtClean="0"/>
+              <a:t>Fill orders</a:t>
+            </a:r>
+          </a:p>
+          <a:p>
+            <a:pPr lvl="1"/>
+            <a:endParaRPr lang="en-CA" dirty="0" smtClean="0"/>
+          </a:p>
+          <a:p>
+            <a:pPr lvl="1"/>
+            <a:endParaRPr lang="en-CA" dirty="0" smtClean="0"/>
+          </a:p>
+        </p:txBody>
+      </p:sp>
+      <p:sp>
+        <p:nvSpPr>
+          <p:cNvPr id="5" name="Content Placeholder 2"/>
+          <p:cNvSpPr txBox="1">
+            <a:spLocks/>
+          </p:cNvSpPr>
+          <p:nvPr/>
+        </p:nvSpPr>
+        <p:spPr>
+          <a:xfrm>
+            <a:off x="7641612" y="2379842"/>
+            <a:ext cx="2663675" cy="4030102"/>
+          </a:xfrm>
+          <a:prstGeom prst="rect">
+            <a:avLst/>
+          </a:prstGeom>
+        </p:spPr>
+        <p:txBody>
+          <a:bodyPr vert="horz" lIns="91440" tIns="45720" rIns="91440" bIns="45720" rtlCol="0">
+            <a:normAutofit/>
+          </a:bodyPr>
+          <a:lstStyle>
+            <a:lvl1pPr marL="228600" indent="-228600" algn="l" defTabSz="914400" rtl="0" eaLnBrk="1" latinLnBrk="0" hangingPunct="1">
+              <a:lnSpc>
+                <a:spcPct val="100000"/>
+              </a:lnSpc>
+              <a:spcBef>
+                <a:spcPts val="1000"/>
+              </a:spcBef>
+              <a:buClr>
+                <a:schemeClr val="accent2"/>
+              </a:buClr>
+              <a:buFont typeface="Arial" panose="020B0604020202020204" pitchFamily="34" charset="0"/>
+              <a:buChar char="•"/>
+              <a:defRPr sz="1800" kern="1200">
+                <a:solidFill>
+                  <a:schemeClr val="tx1">
+                    <a:lumMod val="85000"/>
+                    <a:lumOff val="15000"/>
+                  </a:schemeClr>
+                </a:solidFill>
+                <a:latin typeface="+mn-lt"/>
+                <a:ea typeface="+mn-ea"/>
+                <a:cs typeface="+mn-cs"/>
+              </a:defRPr>
+            </a:lvl1pPr>
+            <a:lvl2pPr marL="457200" indent="-228600" algn="l" defTabSz="914400" rtl="0" eaLnBrk="1" latinLnBrk="0" hangingPunct="1">
+              <a:lnSpc>
+                <a:spcPct val="100000"/>
+              </a:lnSpc>
+              <a:spcBef>
+                <a:spcPts val="1000"/>
+              </a:spcBef>
+              <a:buClr>
+                <a:schemeClr val="accent2"/>
+              </a:buClr>
+              <a:buFont typeface="Arial" panose="020B0604020202020204" pitchFamily="34" charset="0"/>
+              <a:buChar char="•"/>
+              <a:defRPr sz="1600" kern="1200">
+                <a:solidFill>
+                  <a:schemeClr val="tx1">
+                    <a:lumMod val="85000"/>
+                    <a:lumOff val="15000"/>
+                  </a:schemeClr>
+                </a:solidFill>
+                <a:latin typeface="+mn-lt"/>
+                <a:ea typeface="+mn-ea"/>
+                <a:cs typeface="+mn-cs"/>
+              </a:defRPr>
+            </a:lvl2pPr>
+            <a:lvl3pPr marL="685800" indent="-228600" algn="l" defTabSz="914400" rtl="0" eaLnBrk="1" latinLnBrk="0" hangingPunct="1">
+              <a:lnSpc>
+                <a:spcPct val="100000"/>
+              </a:lnSpc>
+              <a:spcBef>
+                <a:spcPts val="1000"/>
+              </a:spcBef>
+              <a:buClr>
+                <a:schemeClr val="accent2"/>
+              </a:buClr>
+              <a:buFont typeface="Arial" panose="020B0604020202020204" pitchFamily="34" charset="0"/>
+              <a:buChar char="•"/>
+              <a:defRPr sz="1600" kern="1200">
+                <a:solidFill>
+                  <a:schemeClr val="tx1">
+                    <a:lumMod val="85000"/>
+                    <a:lumOff val="15000"/>
+                  </a:schemeClr>
+                </a:solidFill>
+                <a:latin typeface="+mn-lt"/>
+                <a:ea typeface="+mn-ea"/>
+                <a:cs typeface="+mn-cs"/>
+              </a:defRPr>
+            </a:lvl3pPr>
+            <a:lvl4pPr marL="914400" indent="-228600" algn="l" defTabSz="914400" rtl="0" eaLnBrk="1" latinLnBrk="0" hangingPunct="1">
+              <a:lnSpc>
+                <a:spcPct val="100000"/>
+              </a:lnSpc>
+              <a:spcBef>
+                <a:spcPts val="1000"/>
+              </a:spcBef>
+              <a:buClr>
+                <a:schemeClr val="accent2"/>
+              </a:buClr>
+              <a:buFont typeface="Arial" panose="020B0604020202020204" pitchFamily="34" charset="0"/>
+              <a:buChar char="•"/>
+              <a:defRPr sz="1600" kern="1200">
+                <a:solidFill>
+                  <a:schemeClr val="tx1">
+                    <a:lumMod val="85000"/>
+                    <a:lumOff val="15000"/>
+                  </a:schemeClr>
+                </a:solidFill>
+                <a:latin typeface="+mn-lt"/>
+                <a:ea typeface="+mn-ea"/>
+                <a:cs typeface="+mn-cs"/>
+              </a:defRPr>
+            </a:lvl4pPr>
+            <a:lvl5pPr marL="1143000" indent="-228600" algn="l" defTabSz="914400" rtl="0" eaLnBrk="1" latinLnBrk="0" hangingPunct="1">
+              <a:lnSpc>
+                <a:spcPct val="100000"/>
+              </a:lnSpc>
+              <a:spcBef>
+                <a:spcPts val="1000"/>
+              </a:spcBef>
+              <a:buClr>
+                <a:schemeClr val="accent2"/>
+              </a:buClr>
+              <a:buFont typeface="Arial" panose="020B0604020202020204" pitchFamily="34" charset="0"/>
+              <a:buChar char="•"/>
+              <a:defRPr sz="1600" kern="1200">
+                <a:solidFill>
+                  <a:schemeClr val="tx1">
+                    <a:lumMod val="85000"/>
+                    <a:lumOff val="15000"/>
+                  </a:schemeClr>
+                </a:solidFill>
+                <a:latin typeface="+mn-lt"/>
+                <a:ea typeface="+mn-ea"/>
+                <a:cs typeface="+mn-cs"/>
+              </a:defRPr>
+            </a:lvl5pPr>
+            <a:lvl6pPr marL="1312863" indent="-228600" algn="l" defTabSz="914400" rtl="0" eaLnBrk="1" latinLnBrk="0" hangingPunct="1">
+              <a:lnSpc>
+                <a:spcPct val="100000"/>
+              </a:lnSpc>
+              <a:spcBef>
+                <a:spcPts val="1000"/>
+              </a:spcBef>
+              <a:buClr>
+                <a:schemeClr val="accent2"/>
+              </a:buClr>
+              <a:buFont typeface="Arial" panose="020B0604020202020204" pitchFamily="34" charset="0"/>
+              <a:buChar char="•"/>
+              <a:defRPr sz="1600" kern="1200">
+                <a:solidFill>
+                  <a:schemeClr val="tx1"/>
+                </a:solidFill>
+                <a:latin typeface="+mn-lt"/>
+                <a:ea typeface="+mn-ea"/>
+                <a:cs typeface="+mn-cs"/>
+              </a:defRPr>
+            </a:lvl6pPr>
+            <a:lvl7pPr marL="1484313" indent="-228600" algn="l" defTabSz="914400" rtl="0" eaLnBrk="1" latinLnBrk="0" hangingPunct="1">
+              <a:lnSpc>
+                <a:spcPct val="100000"/>
+              </a:lnSpc>
+              <a:spcBef>
+                <a:spcPts val="1000"/>
+              </a:spcBef>
+              <a:buClr>
+                <a:schemeClr val="accent2"/>
+              </a:buClr>
+              <a:buFont typeface="Arial" panose="020B0604020202020204" pitchFamily="34" charset="0"/>
+              <a:buChar char="•"/>
+              <a:defRPr sz="1600" kern="1200">
+                <a:solidFill>
+                  <a:schemeClr val="tx1"/>
+                </a:solidFill>
+                <a:latin typeface="+mn-lt"/>
+                <a:ea typeface="+mn-ea"/>
+                <a:cs typeface="+mn-cs"/>
+              </a:defRPr>
+            </a:lvl7pPr>
+            <a:lvl8pPr marL="1657350" indent="-228600" algn="l" defTabSz="914400" rtl="0" eaLnBrk="1" latinLnBrk="0" hangingPunct="1">
+              <a:lnSpc>
+                <a:spcPct val="100000"/>
+              </a:lnSpc>
+              <a:spcBef>
+                <a:spcPts val="1000"/>
+              </a:spcBef>
+              <a:buClr>
+                <a:schemeClr val="accent2"/>
+              </a:buClr>
+              <a:buFont typeface="Arial" panose="020B0604020202020204" pitchFamily="34" charset="0"/>
+              <a:buChar char="•"/>
+              <a:defRPr sz="1600" kern="1200" baseline="0">
+                <a:solidFill>
+                  <a:schemeClr val="tx1"/>
+                </a:solidFill>
+                <a:latin typeface="+mn-lt"/>
+                <a:ea typeface="+mn-ea"/>
+                <a:cs typeface="+mn-cs"/>
+              </a:defRPr>
+            </a:lvl8pPr>
+            <a:lvl9pPr marL="1882775" indent="-228600" algn="l" defTabSz="914400" rtl="0" eaLnBrk="1" latinLnBrk="0" hangingPunct="1">
+              <a:lnSpc>
+                <a:spcPct val="100000"/>
+              </a:lnSpc>
+              <a:spcBef>
+                <a:spcPts val="1000"/>
+              </a:spcBef>
+              <a:buClr>
+                <a:schemeClr val="accent2"/>
+              </a:buClr>
+              <a:buFont typeface="Arial" panose="020B0604020202020204" pitchFamily="34" charset="0"/>
+              <a:buChar char="•"/>
+              <a:defRPr sz="1600" kern="1200" baseline="0">
+                <a:solidFill>
+                  <a:schemeClr val="tx1"/>
+                </a:solidFill>
+                <a:latin typeface="+mn-lt"/>
+                <a:ea typeface="+mn-ea"/>
+                <a:cs typeface="+mn-cs"/>
+              </a:defRPr>
+            </a:lvl9pPr>
+          </a:lstStyle>
+          <a:p>
+            <a:pPr marL="0" indent="0" algn="ctr">
+              <a:buNone/>
+            </a:pPr>
+            <a:r>
+              <a:rPr lang="en-CA" sz="2000" b="1" u="sng" dirty="0" smtClean="0"/>
+              <a:t>Administrator</a:t>
+            </a:r>
+          </a:p>
+          <a:p>
+            <a:pPr lvl="1"/>
             <a:r>
               <a:rPr lang="en-CA" dirty="0"/>
-              <a:t>Shoppers</a:t>
-            </a:r>
-          </a:p>
-          <a:p>
-            <a:r>
-              <a:rPr lang="en-CA" dirty="0"/>
-              <a:t>Private Seller/Business</a:t>
-            </a:r>
-          </a:p>
-          <a:p>
-            <a:r>
-              <a:rPr lang="en-CA" dirty="0"/>
-              <a:t>Admin</a:t>
-            </a:r>
+              <a:t>Moderate </a:t>
+            </a:r>
+            <a:r>
+              <a:rPr lang="en-CA" dirty="0" smtClean="0"/>
+              <a:t>users</a:t>
+            </a:r>
+            <a:endParaRPr lang="en-CA" sz="1800" b="1" dirty="0" smtClean="0"/>
+          </a:p>
+          <a:p>
+            <a:pPr lvl="1"/>
+            <a:r>
+              <a:rPr lang="en-CA" dirty="0" smtClean="0"/>
+              <a:t>View registered users information</a:t>
+            </a:r>
+            <a:endParaRPr lang="en-CA" dirty="0"/>
+          </a:p>
+          <a:p>
+            <a:pPr lvl="1"/>
+            <a:r>
+              <a:rPr lang="en-CA" dirty="0" smtClean="0"/>
+              <a:t>Track and view all reviews</a:t>
+            </a:r>
+            <a:endParaRPr lang="en-CA" dirty="0"/>
+          </a:p>
+          <a:p>
+            <a:pPr marL="0" indent="0" algn="ctr">
+              <a:buNone/>
+            </a:pPr>
+            <a:endParaRPr lang="en-CA" sz="2000" b="1" dirty="0"/>
           </a:p>
         </p:txBody>
       </p:sp>
@@ -3492,6 +4073,13 @@
   <p:clrMapOvr>
     <a:masterClrMapping/>
   </p:clrMapOvr>
+  <p:timing>
+    <p:tnLst>
+      <p:par>
+        <p:cTn id="1" dur="indefinite" restart="never" nodeType="tmRoot"/>
+      </p:par>
+    </p:tnLst>
+  </p:timing>
 </p:sld>
 </file>
 
@@ -3625,6 +4213,13 @@
   <p:clrMapOvr>
     <a:masterClrMapping/>
   </p:clrMapOvr>
+  <p:timing>
+    <p:tnLst>
+      <p:par>
+        <p:cTn id="1" dur="indefinite" restart="never" nodeType="tmRoot"/>
+      </p:par>
+    </p:tnLst>
+  </p:timing>
 </p:sld>
 </file>
 
@@ -3715,6 +4310,13 @@
   <p:clrMapOvr>
     <a:masterClrMapping/>
   </p:clrMapOvr>
+  <p:timing>
+    <p:tnLst>
+      <p:par>
+        <p:cTn id="1" dur="indefinite" restart="never" nodeType="tmRoot"/>
+      </p:par>
+    </p:tnLst>
+  </p:timing>
 </p:sld>
 </file>
 
@@ -3786,7 +4388,7 @@
           <a:graphicData uri="http://schemas.openxmlformats.org/presentationml/2006/ole">
             <mc:AlternateContent xmlns:mc="http://schemas.openxmlformats.org/markup-compatibility/2006">
               <mc:Choice xmlns:v="urn:schemas-microsoft-com:vml" Requires="v">
-                <p:oleObj spid="_x0000_s2053" name="Visio" r:id="rId3" imgW="10668208" imgH="6940712" progId="Visio.Drawing.15">
+                <p:oleObj spid="_x0000_s2057" name="Visio" r:id="rId3" imgW="10668208" imgH="6940712" progId="Visio.Drawing.15">
                   <p:embed/>
                 </p:oleObj>
               </mc:Choice>
@@ -3831,6 +4433,13 @@
   <p:clrMapOvr>
     <a:masterClrMapping/>
   </p:clrMapOvr>
+  <p:timing>
+    <p:tnLst>
+      <p:par>
+        <p:cTn id="1" dur="indefinite" restart="never" nodeType="tmRoot"/>
+      </p:par>
+    </p:tnLst>
+  </p:timing>
 </p:sld>
 </file>
 

</xml_diff>

<commit_message>
minor changes to ppt, eerv2
v2 attempt at seperating users to seller and customer
</commit_message>
<xml_diff>
--- a/471 presentation.pptx
+++ b/471 presentation.pptx
@@ -9,8 +9,7 @@
     <p:sldId id="257" r:id="rId3"/>
     <p:sldId id="258" r:id="rId4"/>
     <p:sldId id="259" r:id="rId5"/>
-    <p:sldId id="264" r:id="rId6"/>
-    <p:sldId id="263" r:id="rId7"/>
+    <p:sldId id="263" r:id="rId6"/>
   </p:sldIdLst>
   <p:sldSz cx="12192000" cy="6858000"/>
   <p:notesSz cx="6858000" cy="9144000"/>
@@ -3284,7 +3283,10 @@
           <a:bodyPr/>
           <a:lstStyle/>
           <a:p>
-            <a:endParaRPr lang="en-CA" dirty="0"/>
+            <a:r>
+              <a:rPr lang="en-CA" dirty="0"/>
+              <a:t>Chi, Saurabh, Changho</a:t>
+            </a:r>
           </a:p>
         </p:txBody>
       </p:sp>
@@ -3399,13 +3401,6 @@
   <p:clrMapOvr>
     <a:masterClrMapping/>
   </p:clrMapOvr>
-  <p:timing>
-    <p:tnLst>
-      <p:par>
-        <p:cTn id="1" dur="indefinite" restart="never" nodeType="tmRoot"/>
-      </p:par>
-    </p:tnLst>
-  </p:timing>
 </p:sld>
 </file>
 
@@ -3481,39 +3476,37 @@
               <a:buNone/>
             </a:pPr>
             <a:r>
-              <a:rPr lang="en-CA" sz="2000" b="1" u="sng" dirty="0" smtClean="0"/>
+              <a:rPr lang="en-CA" sz="2000" b="1" u="sng" dirty="0"/>
               <a:t>Shoppers</a:t>
             </a:r>
           </a:p>
           <a:p>
             <a:pPr lvl="1"/>
             <a:r>
-              <a:rPr lang="en-CA" dirty="0" smtClean="0"/>
+              <a:rPr lang="en-CA" dirty="0"/>
               <a:t>Browse</a:t>
             </a:r>
           </a:p>
           <a:p>
             <a:pPr lvl="1"/>
             <a:r>
-              <a:rPr lang="en-CA" dirty="0" smtClean="0"/>
+              <a:rPr lang="en-CA" dirty="0"/>
               <a:t>Add items to shopping cart</a:t>
             </a:r>
           </a:p>
           <a:p>
             <a:pPr lvl="1"/>
             <a:r>
-              <a:rPr lang="en-CA" dirty="0" smtClean="0"/>
+              <a:rPr lang="en-CA" dirty="0"/>
               <a:t>Purchase items</a:t>
             </a:r>
-            <a:endParaRPr lang="en-CA" dirty="0"/>
           </a:p>
           <a:p>
             <a:pPr lvl="1"/>
             <a:r>
-              <a:rPr lang="en-CA" dirty="0" smtClean="0"/>
+              <a:rPr lang="en-CA" dirty="0"/>
               <a:t>Leave seller/item reviews</a:t>
             </a:r>
-            <a:endParaRPr lang="en-CA" dirty="0"/>
           </a:p>
         </p:txBody>
       </p:sp>
@@ -3749,45 +3742,45 @@
               <a:buNone/>
             </a:pPr>
             <a:r>
-              <a:rPr lang="en-CA" sz="2000" b="1" u="sng" dirty="0" smtClean="0"/>
+              <a:rPr lang="en-CA" sz="2000" b="1" u="sng" dirty="0"/>
               <a:t>Private Seller/Business</a:t>
             </a:r>
           </a:p>
           <a:p>
             <a:pPr lvl="1"/>
             <a:r>
-              <a:rPr lang="en-CA" dirty="0" smtClean="0"/>
+              <a:rPr lang="en-CA" dirty="0"/>
               <a:t>Post items to sell</a:t>
             </a:r>
           </a:p>
           <a:p>
             <a:pPr lvl="1"/>
             <a:r>
-              <a:rPr lang="en-CA" dirty="0" smtClean="0"/>
+              <a:rPr lang="en-CA" dirty="0"/>
               <a:t>Fill in product description</a:t>
             </a:r>
           </a:p>
           <a:p>
             <a:pPr lvl="1"/>
             <a:r>
-              <a:rPr lang="en-CA" dirty="0" smtClean="0"/>
+              <a:rPr lang="en-CA" dirty="0"/>
               <a:t>Update inventory</a:t>
             </a:r>
           </a:p>
           <a:p>
             <a:pPr lvl="1"/>
             <a:r>
-              <a:rPr lang="en-CA" dirty="0" smtClean="0"/>
+              <a:rPr lang="en-CA" dirty="0"/>
               <a:t>Fill orders</a:t>
             </a:r>
           </a:p>
           <a:p>
             <a:pPr lvl="1"/>
-            <a:endParaRPr lang="en-CA" dirty="0" smtClean="0"/>
+            <a:endParaRPr lang="en-CA" dirty="0"/>
           </a:p>
           <a:p>
             <a:pPr lvl="1"/>
-            <a:endParaRPr lang="en-CA" dirty="0" smtClean="0"/>
+            <a:endParaRPr lang="en-CA" dirty="0"/>
           </a:p>
         </p:txBody>
       </p:sp>
@@ -4023,7 +4016,7 @@
               <a:buNone/>
             </a:pPr>
             <a:r>
-              <a:rPr lang="en-CA" sz="2000" b="1" u="sng" dirty="0" smtClean="0"/>
+              <a:rPr lang="en-CA" sz="2000" b="1" u="sng" dirty="0"/>
               <a:t>Administrator</a:t>
             </a:r>
           </a:p>
@@ -4031,29 +4024,23 @@
             <a:pPr lvl="1"/>
             <a:r>
               <a:rPr lang="en-CA" dirty="0"/>
-              <a:t>Moderate </a:t>
-            </a:r>
-            <a:r>
-              <a:rPr lang="en-CA" dirty="0" smtClean="0"/>
-              <a:t>users</a:t>
-            </a:r>
-            <a:endParaRPr lang="en-CA" sz="1800" b="1" dirty="0" smtClean="0"/>
+              <a:t>Moderate users</a:t>
+            </a:r>
+            <a:endParaRPr lang="en-CA" sz="1800" b="1" dirty="0"/>
           </a:p>
           <a:p>
             <a:pPr lvl="1"/>
             <a:r>
-              <a:rPr lang="en-CA" dirty="0" smtClean="0"/>
+              <a:rPr lang="en-CA" dirty="0"/>
               <a:t>View registered users information</a:t>
             </a:r>
-            <a:endParaRPr lang="en-CA" dirty="0"/>
           </a:p>
           <a:p>
             <a:pPr lvl="1"/>
             <a:r>
-              <a:rPr lang="en-CA" dirty="0" smtClean="0"/>
+              <a:rPr lang="en-CA" dirty="0"/>
               <a:t>Track and view all reviews</a:t>
             </a:r>
-            <a:endParaRPr lang="en-CA" dirty="0"/>
           </a:p>
           <a:p>
             <a:pPr marL="0" indent="0" algn="ctr">
@@ -4073,13 +4060,6 @@
   <p:clrMapOvr>
     <a:masterClrMapping/>
   </p:clrMapOvr>
-  <p:timing>
-    <p:tnLst>
-      <p:par>
-        <p:cTn id="1" dur="indefinite" restart="never" nodeType="tmRoot"/>
-      </p:par>
-    </p:tnLst>
-  </p:timing>
 </p:sld>
 </file>
 
@@ -4213,13 +4193,6 @@
   <p:clrMapOvr>
     <a:masterClrMapping/>
   </p:clrMapOvr>
-  <p:timing>
-    <p:tnLst>
-      <p:par>
-        <p:cTn id="1" dur="indefinite" restart="never" nodeType="tmRoot"/>
-      </p:par>
-    </p:tnLst>
-  </p:timing>
 </p:sld>
 </file>
 
@@ -4252,103 +4225,6 @@
         </p:nvSpPr>
         <p:spPr>
           <a:xfrm>
-            <a:off x="2231136" y="964692"/>
-            <a:ext cx="4511409" cy="550072"/>
-          </a:xfrm>
-        </p:spPr>
-        <p:txBody>
-          <a:bodyPr>
-            <a:normAutofit fontScale="90000"/>
-          </a:bodyPr>
-          <a:lstStyle/>
-          <a:p>
-            <a:r>
-              <a:rPr lang="en-CA" dirty="0"/>
-              <a:t>Sample transactions</a:t>
-            </a:r>
-          </a:p>
-        </p:txBody>
-      </p:sp>
-      <p:sp>
-        <p:nvSpPr>
-          <p:cNvPr id="3" name="Content Placeholder 2"/>
-          <p:cNvSpPr>
-            <a:spLocks noGrp="1"/>
-          </p:cNvSpPr>
-          <p:nvPr>
-            <p:ph idx="1"/>
-          </p:nvPr>
-        </p:nvSpPr>
-        <p:spPr/>
-        <p:txBody>
-          <a:bodyPr/>
-          <a:lstStyle/>
-          <a:p>
-            <a:r>
-              <a:rPr lang="en-CA" dirty="0"/>
-              <a:t>Users can add products to their shopping cart</a:t>
-            </a:r>
-          </a:p>
-          <a:p>
-            <a:r>
-              <a:rPr lang="en-CA" dirty="0"/>
-              <a:t>Users can place orders</a:t>
-            </a:r>
-          </a:p>
-          <a:p>
-            <a:endParaRPr lang="en-CA" dirty="0"/>
-          </a:p>
-        </p:txBody>
-      </p:sp>
-    </p:spTree>
-    <p:extLst>
-      <p:ext uri="{BB962C8B-B14F-4D97-AF65-F5344CB8AC3E}">
-        <p14:creationId xmlns:p14="http://schemas.microsoft.com/office/powerpoint/2010/main" val="3696349257"/>
-      </p:ext>
-    </p:extLst>
-  </p:cSld>
-  <p:clrMapOvr>
-    <a:masterClrMapping/>
-  </p:clrMapOvr>
-  <p:timing>
-    <p:tnLst>
-      <p:par>
-        <p:cTn id="1" dur="indefinite" restart="never" nodeType="tmRoot"/>
-      </p:par>
-    </p:tnLst>
-  </p:timing>
-</p:sld>
-</file>
-
-<file path=ppt/slides/slide6.xml><?xml version="1.0" encoding="utf-8"?>
-<p:sld xmlns:a="http://schemas.openxmlformats.org/drawingml/2006/main" xmlns:r="http://schemas.openxmlformats.org/officeDocument/2006/relationships" xmlns:p="http://schemas.openxmlformats.org/presentationml/2006/main">
-  <p:cSld>
-    <p:spTree>
-      <p:nvGrpSpPr>
-        <p:cNvPr id="1" name=""/>
-        <p:cNvGrpSpPr/>
-        <p:nvPr/>
-      </p:nvGrpSpPr>
-      <p:grpSpPr>
-        <a:xfrm>
-          <a:off x="0" y="0"/>
-          <a:ext cx="0" cy="0"/>
-          <a:chOff x="0" y="0"/>
-          <a:chExt cx="0" cy="0"/>
-        </a:xfrm>
-      </p:grpSpPr>
-      <p:sp>
-        <p:nvSpPr>
-          <p:cNvPr id="2" name="Title 1"/>
-          <p:cNvSpPr>
-            <a:spLocks noGrp="1"/>
-          </p:cNvSpPr>
-          <p:nvPr>
-            <p:ph type="title"/>
-          </p:nvPr>
-        </p:nvSpPr>
-        <p:spPr>
-          <a:xfrm>
             <a:off x="337681" y="212437"/>
             <a:ext cx="2811919" cy="480290"/>
           </a:xfrm>
@@ -4388,7 +4264,7 @@
           <a:graphicData uri="http://schemas.openxmlformats.org/presentationml/2006/ole">
             <mc:AlternateContent xmlns:mc="http://schemas.openxmlformats.org/markup-compatibility/2006">
               <mc:Choice xmlns:v="urn:schemas-microsoft-com:vml" Requires="v">
-                <p:oleObj spid="_x0000_s2057" name="Visio" r:id="rId3" imgW="10668208" imgH="6940712" progId="Visio.Drawing.15">
+                <p:oleObj spid="_x0000_s2060" name="Visio" r:id="rId3" imgW="10668208" imgH="6940712" progId="Visio.Drawing.15">
                   <p:embed/>
                 </p:oleObj>
               </mc:Choice>
@@ -4433,13 +4309,6 @@
   <p:clrMapOvr>
     <a:masterClrMapping/>
   </p:clrMapOvr>
-  <p:timing>
-    <p:tnLst>
-      <p:par>
-        <p:cTn id="1" dur="indefinite" restart="never" nodeType="tmRoot"/>
-      </p:par>
-    </p:tnLst>
-  </p:timing>
 </p:sld>
 </file>
 

</xml_diff>

<commit_message>
Added Lists relationship updated pptx diagram
</commit_message>
<xml_diff>
--- a/471 presentation.pptx
+++ b/471 presentation.pptx
@@ -4242,63 +4242,30 @@
           </a:p>
         </p:txBody>
       </p:sp>
-      <p:graphicFrame>
-        <p:nvGraphicFramePr>
-          <p:cNvPr id="4" name="Object 3"/>
-          <p:cNvGraphicFramePr>
-            <a:graphicFrameLocks noChangeAspect="1"/>
-          </p:cNvGraphicFramePr>
-          <p:nvPr>
-            <p:extLst>
-              <p:ext uri="{D42A27DB-BD31-4B8C-83A1-F6EECF244321}">
-                <p14:modId xmlns:p14="http://schemas.microsoft.com/office/powerpoint/2010/main" val="3562496216"/>
-              </p:ext>
-            </p:extLst>
-          </p:nvPr>
-        </p:nvGraphicFramePr>
-        <p:xfrm>
-          <a:off x="337681" y="785091"/>
-          <a:ext cx="11392501" cy="5938982"/>
-        </p:xfrm>
-        <a:graphic>
-          <a:graphicData uri="http://schemas.openxmlformats.org/presentationml/2006/ole">
-            <mc:AlternateContent xmlns:mc="http://schemas.openxmlformats.org/markup-compatibility/2006">
-              <mc:Choice xmlns:v="urn:schemas-microsoft-com:vml" Requires="v">
-                <p:oleObj spid="_x0000_s2060" name="Visio" r:id="rId3" imgW="10668208" imgH="6940712" progId="Visio.Drawing.15">
-                  <p:embed/>
-                </p:oleObj>
-              </mc:Choice>
-              <mc:Fallback>
-                <p:oleObj name="Visio" r:id="rId3" imgW="10668208" imgH="6940712" progId="Visio.Drawing.15">
-                  <p:embed/>
-                  <p:pic>
-                    <p:nvPicPr>
-                      <p:cNvPr id="0" name=""/>
-                      <p:cNvPicPr/>
-                      <p:nvPr/>
-                    </p:nvPicPr>
-                    <p:blipFill>
-                      <a:blip r:embed="rId4"/>
-                      <a:stretch>
-                        <a:fillRect/>
-                      </a:stretch>
-                    </p:blipFill>
-                    <p:spPr>
-                      <a:xfrm>
-                        <a:off x="337681" y="785091"/>
-                        <a:ext cx="11392501" cy="5938982"/>
-                      </a:xfrm>
-                      <a:prstGeom prst="rect">
-                        <a:avLst/>
-                      </a:prstGeom>
-                    </p:spPr>
-                  </p:pic>
-                </p:oleObj>
-              </mc:Fallback>
-            </mc:AlternateContent>
-          </a:graphicData>
-        </a:graphic>
-      </p:graphicFrame>
+      <p:pic>
+        <p:nvPicPr>
+          <p:cNvPr id="5" name="Picture 4"/>
+          <p:cNvPicPr>
+            <a:picLocks noChangeAspect="1"/>
+          </p:cNvPicPr>
+          <p:nvPr/>
+        </p:nvPicPr>
+        <p:blipFill>
+          <a:blip r:embed="rId2"/>
+          <a:stretch>
+            <a:fillRect/>
+          </a:stretch>
+        </p:blipFill>
+        <p:spPr>
+          <a:xfrm>
+            <a:off x="1665274" y="914401"/>
+            <a:ext cx="8697662" cy="5648035"/>
+          </a:xfrm>
+          <a:prstGeom prst="rect">
+            <a:avLst/>
+          </a:prstGeom>
+        </p:spPr>
+      </p:pic>
     </p:spTree>
     <p:extLst>
       <p:ext uri="{BB962C8B-B14F-4D97-AF65-F5344CB8AC3E}">

</xml_diff>

<commit_message>
updated ppx ER diagram
</commit_message>
<xml_diff>
--- a/471 presentation.pptx
+++ b/471 presentation.pptx
@@ -4244,7 +4244,7 @@
       </p:sp>
       <p:pic>
         <p:nvPicPr>
-          <p:cNvPr id="5" name="Picture 4"/>
+          <p:cNvPr id="4" name="Picture 3"/>
           <p:cNvPicPr>
             <a:picLocks noChangeAspect="1"/>
           </p:cNvPicPr>
@@ -4258,8 +4258,8 @@
         </p:blipFill>
         <p:spPr>
           <a:xfrm>
-            <a:off x="1665274" y="914401"/>
-            <a:ext cx="8697662" cy="5648035"/>
+            <a:off x="1551710" y="849746"/>
+            <a:ext cx="9245810" cy="5842000"/>
           </a:xfrm>
           <a:prstGeom prst="rect">
             <a:avLst/>

</xml_diff>

<commit_message>
Added a slide and made some changes
Added the questions slide. Made some changes to the Target application
slide and added our last names and group number to the first slide
</commit_message>
<xml_diff>
--- a/471 presentation.pptx
+++ b/471 presentation.pptx
@@ -10,6 +10,7 @@
     <p:sldId id="258" r:id="rId4"/>
     <p:sldId id="259" r:id="rId5"/>
     <p:sldId id="263" r:id="rId6"/>
+    <p:sldId id="264" r:id="rId7"/>
   </p:sldIdLst>
   <p:sldSz cx="12192000" cy="6858000"/>
   <p:notesSz cx="6858000" cy="9144000"/>
@@ -3284,9 +3285,34 @@
           <a:lstStyle/>
           <a:p>
             <a:r>
-              <a:rPr lang="en-CA" dirty="0"/>
-              <a:t>Chi, Saurabh, Changho</a:t>
-            </a:r>
+              <a:rPr lang="en-CA" dirty="0" smtClean="0"/>
+              <a:t>Group 19: Chi Nguyen,  </a:t>
+            </a:r>
+            <a:r>
+              <a:rPr lang="en-CA" dirty="0" err="1" smtClean="0"/>
+              <a:t>Saurabh</a:t>
+            </a:r>
+            <a:r>
+              <a:rPr lang="en-CA" dirty="0" smtClean="0"/>
+              <a:t> </a:t>
+            </a:r>
+            <a:r>
+              <a:rPr lang="en-CA" dirty="0" err="1" smtClean="0"/>
+              <a:t>Tomar</a:t>
+            </a:r>
+            <a:r>
+              <a:rPr lang="en-CA" dirty="0" smtClean="0"/>
+              <a:t>,  </a:t>
+            </a:r>
+            <a:r>
+              <a:rPr lang="en-CA" dirty="0" err="1" smtClean="0"/>
+              <a:t>Changho</a:t>
+            </a:r>
+            <a:r>
+              <a:rPr lang="en-CA" dirty="0" smtClean="0"/>
+              <a:t> Lee</a:t>
+            </a:r>
+            <a:endParaRPr lang="en-CA" dirty="0"/>
           </a:p>
         </p:txBody>
       </p:sp>
@@ -3300,6 +3326,13 @@
   <p:clrMapOvr>
     <a:masterClrMapping/>
   </p:clrMapOvr>
+  <p:timing>
+    <p:tnLst>
+      <p:par>
+        <p:cTn id="1" dur="indefinite" restart="never" nodeType="tmRoot"/>
+      </p:par>
+    </p:tnLst>
+  </p:timing>
 </p:sld>
 </file>
 
@@ -3361,7 +3394,7 @@
         </p:nvSpPr>
         <p:spPr>
           <a:xfrm>
-            <a:off x="2231136" y="2078182"/>
+            <a:off x="2231136" y="2338377"/>
             <a:ext cx="7729728" cy="3661845"/>
           </a:xfrm>
         </p:spPr>
@@ -3369,18 +3402,53 @@
           <a:bodyPr/>
           <a:lstStyle/>
           <a:p>
+            <a:pPr>
+              <a:lnSpc>
+                <a:spcPct val="150000"/>
+              </a:lnSpc>
+            </a:pPr>
             <a:r>
               <a:rPr lang="en-CA" dirty="0"/>
-              <a:t>Creating a market database</a:t>
-            </a:r>
-          </a:p>
-          <a:p>
+              <a:t>O</a:t>
+            </a:r>
+            <a:r>
+              <a:rPr lang="en-CA" dirty="0" smtClean="0"/>
+              <a:t>nline market place database</a:t>
+            </a:r>
+          </a:p>
+          <a:p>
+            <a:pPr>
+              <a:lnSpc>
+                <a:spcPct val="150000"/>
+              </a:lnSpc>
+            </a:pPr>
+            <a:r>
+              <a:rPr lang="en-CA" dirty="0" smtClean="0"/>
+              <a:t>Register users who want to use the market place</a:t>
+            </a:r>
+            <a:endParaRPr lang="en-CA" dirty="0" smtClean="0"/>
+          </a:p>
+          <a:p>
+            <a:pPr>
+              <a:lnSpc>
+                <a:spcPct val="150000"/>
+              </a:lnSpc>
+            </a:pPr>
+            <a:r>
+              <a:rPr lang="en-CA" dirty="0" smtClean="0"/>
+              <a:t>Allowing </a:t>
+            </a:r>
             <a:r>
               <a:rPr lang="en-CA" dirty="0"/>
-              <a:t>Allowing users to view/buy products</a:t>
-            </a:r>
-          </a:p>
-          <a:p>
+              <a:t>users to view/buy products</a:t>
+            </a:r>
+          </a:p>
+          <a:p>
+            <a:pPr>
+              <a:lnSpc>
+                <a:spcPct val="150000"/>
+              </a:lnSpc>
+            </a:pPr>
             <a:r>
               <a:rPr lang="en-CA" dirty="0"/>
               <a:t>Allowing sellers to list products</a:t>
@@ -3401,6 +3469,13 @@
   <p:clrMapOvr>
     <a:masterClrMapping/>
   </p:clrMapOvr>
+  <p:timing>
+    <p:tnLst>
+      <p:par>
+        <p:cTn id="1" dur="indefinite" restart="never" nodeType="tmRoot"/>
+      </p:par>
+    </p:tnLst>
+  </p:timing>
 </p:sld>
 </file>
 
@@ -3462,7 +3537,7 @@
         </p:nvSpPr>
         <p:spPr>
           <a:xfrm>
-            <a:off x="1212827" y="2379842"/>
+            <a:off x="1212827" y="2721812"/>
             <a:ext cx="3127248" cy="2987686"/>
           </a:xfrm>
         </p:spPr>
@@ -3473,6 +3548,9 @@
           <a:lstStyle/>
           <a:p>
             <a:pPr marL="0" indent="0" algn="ctr">
+              <a:lnSpc>
+                <a:spcPct val="150000"/>
+              </a:lnSpc>
               <a:buNone/>
             </a:pPr>
             <a:r>
@@ -3481,7 +3559,11 @@
             </a:r>
           </a:p>
           <a:p>
-            <a:pPr lvl="1"/>
+            <a:pPr lvl="1">
+              <a:lnSpc>
+                <a:spcPct val="150000"/>
+              </a:lnSpc>
+            </a:pPr>
             <a:r>
               <a:rPr lang="en-CA" dirty="0"/>
               <a:t>Browse</a:t>
@@ -3520,7 +3602,7 @@
         </p:nvSpPr>
         <p:spPr>
           <a:xfrm>
-            <a:off x="4464765" y="2418820"/>
+            <a:off x="4457330" y="2721812"/>
             <a:ext cx="2927466" cy="4030102"/>
           </a:xfrm>
           <a:prstGeom prst="rect">
@@ -3739,6 +3821,9 @@
           </a:lstStyle>
           <a:p>
             <a:pPr marL="0" indent="0" algn="ctr">
+              <a:lnSpc>
+                <a:spcPct val="150000"/>
+              </a:lnSpc>
               <a:buNone/>
             </a:pPr>
             <a:r>
@@ -3747,7 +3832,11 @@
             </a:r>
           </a:p>
           <a:p>
-            <a:pPr lvl="1"/>
+            <a:pPr lvl="1">
+              <a:lnSpc>
+                <a:spcPct val="150000"/>
+              </a:lnSpc>
+            </a:pPr>
             <a:r>
               <a:rPr lang="en-CA" dirty="0"/>
               <a:t>Post items to sell</a:t>
@@ -3794,7 +3883,7 @@
         </p:nvSpPr>
         <p:spPr>
           <a:xfrm>
-            <a:off x="7641612" y="2379842"/>
+            <a:off x="7634178" y="2721812"/>
             <a:ext cx="2663675" cy="4030102"/>
           </a:xfrm>
           <a:prstGeom prst="rect">
@@ -4013,6 +4102,9 @@
           </a:lstStyle>
           <a:p>
             <a:pPr marL="0" indent="0" algn="ctr">
+              <a:lnSpc>
+                <a:spcPct val="150000"/>
+              </a:lnSpc>
               <a:buNone/>
             </a:pPr>
             <a:r>
@@ -4021,7 +4113,11 @@
             </a:r>
           </a:p>
           <a:p>
-            <a:pPr lvl="1"/>
+            <a:pPr lvl="1">
+              <a:lnSpc>
+                <a:spcPct val="150000"/>
+              </a:lnSpc>
+            </a:pPr>
             <a:r>
               <a:rPr lang="en-CA" dirty="0"/>
               <a:t>Moderate users</a:t>
@@ -4060,6 +4156,13 @@
   <p:clrMapOvr>
     <a:masterClrMapping/>
   </p:clrMapOvr>
+  <p:timing>
+    <p:tnLst>
+      <p:par>
+        <p:cTn id="1" dur="indefinite" restart="never" nodeType="tmRoot"/>
+      </p:par>
+    </p:tnLst>
+  </p:timing>
 </p:sld>
 </file>
 
@@ -4193,6 +4296,13 @@
   <p:clrMapOvr>
     <a:masterClrMapping/>
   </p:clrMapOvr>
+  <p:timing>
+    <p:tnLst>
+      <p:par>
+        <p:cTn id="1" dur="indefinite" restart="never" nodeType="tmRoot"/>
+      </p:par>
+    </p:tnLst>
+  </p:timing>
 </p:sld>
 </file>
 
@@ -4276,6 +4386,78 @@
   <p:clrMapOvr>
     <a:masterClrMapping/>
   </p:clrMapOvr>
+  <p:timing>
+    <p:tnLst>
+      <p:par>
+        <p:cTn id="1" dur="indefinite" restart="never" nodeType="tmRoot"/>
+      </p:par>
+    </p:tnLst>
+  </p:timing>
+</p:sld>
+</file>
+
+<file path=ppt/slides/slide6.xml><?xml version="1.0" encoding="utf-8"?>
+<p:sld xmlns:a="http://schemas.openxmlformats.org/drawingml/2006/main" xmlns:r="http://schemas.openxmlformats.org/officeDocument/2006/relationships" xmlns:p="http://schemas.openxmlformats.org/presentationml/2006/main">
+  <p:cSld>
+    <p:spTree>
+      <p:nvGrpSpPr>
+        <p:cNvPr id="1" name=""/>
+        <p:cNvGrpSpPr/>
+        <p:nvPr/>
+      </p:nvGrpSpPr>
+      <p:grpSpPr>
+        <a:xfrm>
+          <a:off x="0" y="0"/>
+          <a:ext cx="0" cy="0"/>
+          <a:chOff x="0" y="0"/>
+          <a:chExt cx="0" cy="0"/>
+        </a:xfrm>
+      </p:grpSpPr>
+      <p:sp>
+        <p:nvSpPr>
+          <p:cNvPr id="2" name="Title 1"/>
+          <p:cNvSpPr>
+            <a:spLocks noGrp="1"/>
+          </p:cNvSpPr>
+          <p:nvPr>
+            <p:ph type="title"/>
+          </p:nvPr>
+        </p:nvSpPr>
+        <p:spPr>
+          <a:xfrm>
+            <a:off x="2164230" y="2867833"/>
+            <a:ext cx="7729728" cy="1188720"/>
+          </a:xfrm>
+        </p:spPr>
+        <p:txBody>
+          <a:bodyPr/>
+          <a:lstStyle/>
+          <a:p>
+            <a:r>
+              <a:rPr lang="en-CA" dirty="0" smtClean="0"/>
+              <a:t>Questions?</a:t>
+            </a:r>
+            <a:endParaRPr lang="en-CA" dirty="0"/>
+          </a:p>
+        </p:txBody>
+      </p:sp>
+    </p:spTree>
+    <p:extLst>
+      <p:ext uri="{BB962C8B-B14F-4D97-AF65-F5344CB8AC3E}">
+        <p14:creationId xmlns:p14="http://schemas.microsoft.com/office/powerpoint/2010/main" val="1187921398"/>
+      </p:ext>
+    </p:extLst>
+  </p:cSld>
+  <p:clrMapOvr>
+    <a:masterClrMapping/>
+  </p:clrMapOvr>
+  <p:timing>
+    <p:tnLst>
+      <p:par>
+        <p:cTn id="1" dur="indefinite" restart="never" nodeType="tmRoot"/>
+      </p:par>
+    </p:tnLst>
+  </p:timing>
 </p:sld>
 </file>
 

</xml_diff>